<commit_message>
revised based on comments
</commit_message>
<xml_diff>
--- a/presentation.pptx
+++ b/presentation.pptx
@@ -17,6 +17,10 @@
     <p:sldId id="259" r:id="rId11"/>
     <p:sldId id="267" r:id="rId12"/>
     <p:sldId id="262" r:id="rId13"/>
+    <p:sldId id="270" r:id="rId14"/>
+    <p:sldId id="272" r:id="rId15"/>
+    <p:sldId id="273" r:id="rId16"/>
+    <p:sldId id="269" r:id="rId17"/>
   </p:sldIdLst>
   <p:sldSz cx="12192000" cy="6858000"/>
   <p:notesSz cx="6858000" cy="9144000"/>
@@ -115,6 +119,11 @@
       </a:defRPr>
     </a:lvl9pPr>
   </p:defaultTextStyle>
+  <p:extLst>
+    <p:ext uri="{EFAFB233-063F-42B5-8137-9DF3F51BA10A}">
+      <p15:sldGuideLst xmlns:p15="http://schemas.microsoft.com/office/powerpoint/2012/main"/>
+    </p:ext>
+  </p:extLst>
 </p:presentation>
 </file>
 
@@ -265,7 +274,7 @@
           <a:p>
             <a:fld id="{49DD5F41-4351-1F47-B7E8-36D0C8A1DD6D}" type="datetimeFigureOut">
               <a:rPr lang="en-US" smtClean="0"/>
-              <a:t>9/26/23</a:t>
+              <a:t>9/28/23</a:t>
             </a:fld>
             <a:endParaRPr lang="en-US"/>
           </a:p>
@@ -335,13 +344,13 @@
   <p:clrMapOvr>
     <a:masterClrMapping/>
   </p:clrMapOvr>
-  <mc:AlternateContent xmlns:mc="http://schemas.openxmlformats.org/markup-compatibility/2006">
-    <mc:Choice xmlns:p159="http://schemas.microsoft.com/office/powerpoint/2015/09/main" Requires="p159">
+  <mc:AlternateContent xmlns:mc="http://schemas.openxmlformats.org/markup-compatibility/2006" xmlns:p159="http://schemas.microsoft.com/office/powerpoint/2015/09/main">
+    <mc:Choice Requires="p159">
       <p:transition xmlns:p14="http://schemas.microsoft.com/office/powerpoint/2010/main" spd="slow" p14:dur="2000">
         <p159:morph option="byObject"/>
       </p:transition>
     </mc:Choice>
-    <mc:Fallback>
+    <mc:Fallback xmlns="">
       <p:transition spd="slow">
         <p:fade/>
       </p:transition>
@@ -475,7 +484,7 @@
           <a:p>
             <a:fld id="{49DD5F41-4351-1F47-B7E8-36D0C8A1DD6D}" type="datetimeFigureOut">
               <a:rPr lang="en-US" smtClean="0"/>
-              <a:t>9/26/23</a:t>
+              <a:t>9/28/23</a:t>
             </a:fld>
             <a:endParaRPr lang="en-US"/>
           </a:p>
@@ -545,13 +554,13 @@
   <p:clrMapOvr>
     <a:masterClrMapping/>
   </p:clrMapOvr>
-  <mc:AlternateContent xmlns:mc="http://schemas.openxmlformats.org/markup-compatibility/2006">
-    <mc:Choice xmlns:p159="http://schemas.microsoft.com/office/powerpoint/2015/09/main" Requires="p159">
+  <mc:AlternateContent xmlns:mc="http://schemas.openxmlformats.org/markup-compatibility/2006" xmlns:p159="http://schemas.microsoft.com/office/powerpoint/2015/09/main">
+    <mc:Choice Requires="p159">
       <p:transition xmlns:p14="http://schemas.microsoft.com/office/powerpoint/2010/main" spd="slow" p14:dur="2000">
         <p159:morph option="byObject"/>
       </p:transition>
     </mc:Choice>
-    <mc:Fallback>
+    <mc:Fallback xmlns="">
       <p:transition spd="slow">
         <p:fade/>
       </p:transition>
@@ -695,7 +704,7 @@
           <a:p>
             <a:fld id="{49DD5F41-4351-1F47-B7E8-36D0C8A1DD6D}" type="datetimeFigureOut">
               <a:rPr lang="en-US" smtClean="0"/>
-              <a:t>9/26/23</a:t>
+              <a:t>9/28/23</a:t>
             </a:fld>
             <a:endParaRPr lang="en-US"/>
           </a:p>
@@ -765,13 +774,13 @@
   <p:clrMapOvr>
     <a:masterClrMapping/>
   </p:clrMapOvr>
-  <mc:AlternateContent xmlns:mc="http://schemas.openxmlformats.org/markup-compatibility/2006">
-    <mc:Choice xmlns:p159="http://schemas.microsoft.com/office/powerpoint/2015/09/main" Requires="p159">
+  <mc:AlternateContent xmlns:mc="http://schemas.openxmlformats.org/markup-compatibility/2006" xmlns:p159="http://schemas.microsoft.com/office/powerpoint/2015/09/main">
+    <mc:Choice Requires="p159">
       <p:transition xmlns:p14="http://schemas.microsoft.com/office/powerpoint/2010/main" spd="slow" p14:dur="2000">
         <p159:morph option="byObject"/>
       </p:transition>
     </mc:Choice>
-    <mc:Fallback>
+    <mc:Fallback xmlns="">
       <p:transition spd="slow">
         <p:fade/>
       </p:transition>
@@ -905,7 +914,7 @@
           <a:p>
             <a:fld id="{49DD5F41-4351-1F47-B7E8-36D0C8A1DD6D}" type="datetimeFigureOut">
               <a:rPr lang="en-US" smtClean="0"/>
-              <a:t>9/26/23</a:t>
+              <a:t>9/28/23</a:t>
             </a:fld>
             <a:endParaRPr lang="en-US"/>
           </a:p>
@@ -975,13 +984,13 @@
   <p:clrMapOvr>
     <a:masterClrMapping/>
   </p:clrMapOvr>
-  <mc:AlternateContent xmlns:mc="http://schemas.openxmlformats.org/markup-compatibility/2006">
-    <mc:Choice xmlns:p159="http://schemas.microsoft.com/office/powerpoint/2015/09/main" Requires="p159">
+  <mc:AlternateContent xmlns:mc="http://schemas.openxmlformats.org/markup-compatibility/2006" xmlns:p159="http://schemas.microsoft.com/office/powerpoint/2015/09/main">
+    <mc:Choice Requires="p159">
       <p:transition xmlns:p14="http://schemas.microsoft.com/office/powerpoint/2010/main" spd="slow" p14:dur="2000">
         <p159:morph option="byObject"/>
       </p:transition>
     </mc:Choice>
-    <mc:Fallback>
+    <mc:Fallback xmlns="">
       <p:transition spd="slow">
         <p:fade/>
       </p:transition>
@@ -1192,7 +1201,7 @@
           <a:p>
             <a:fld id="{49DD5F41-4351-1F47-B7E8-36D0C8A1DD6D}" type="datetimeFigureOut">
               <a:rPr lang="en-US" smtClean="0"/>
-              <a:t>9/26/23</a:t>
+              <a:t>9/28/23</a:t>
             </a:fld>
             <a:endParaRPr lang="en-US"/>
           </a:p>
@@ -1262,13 +1271,13 @@
   <p:clrMapOvr>
     <a:masterClrMapping/>
   </p:clrMapOvr>
-  <mc:AlternateContent xmlns:mc="http://schemas.openxmlformats.org/markup-compatibility/2006">
-    <mc:Choice xmlns:p159="http://schemas.microsoft.com/office/powerpoint/2015/09/main" Requires="p159">
+  <mc:AlternateContent xmlns:mc="http://schemas.openxmlformats.org/markup-compatibility/2006" xmlns:p159="http://schemas.microsoft.com/office/powerpoint/2015/09/main">
+    <mc:Choice Requires="p159">
       <p:transition xmlns:p14="http://schemas.microsoft.com/office/powerpoint/2010/main" spd="slow" p14:dur="2000">
         <p159:morph option="byObject"/>
       </p:transition>
     </mc:Choice>
-    <mc:Fallback>
+    <mc:Fallback xmlns="">
       <p:transition spd="slow">
         <p:fade/>
       </p:transition>
@@ -1469,7 +1478,7 @@
           <a:p>
             <a:fld id="{49DD5F41-4351-1F47-B7E8-36D0C8A1DD6D}" type="datetimeFigureOut">
               <a:rPr lang="en-US" smtClean="0"/>
-              <a:t>9/26/23</a:t>
+              <a:t>9/28/23</a:t>
             </a:fld>
             <a:endParaRPr lang="en-US"/>
           </a:p>
@@ -1539,13 +1548,13 @@
   <p:clrMapOvr>
     <a:masterClrMapping/>
   </p:clrMapOvr>
-  <mc:AlternateContent xmlns:mc="http://schemas.openxmlformats.org/markup-compatibility/2006">
-    <mc:Choice xmlns:p159="http://schemas.microsoft.com/office/powerpoint/2015/09/main" Requires="p159">
+  <mc:AlternateContent xmlns:mc="http://schemas.openxmlformats.org/markup-compatibility/2006" xmlns:p159="http://schemas.microsoft.com/office/powerpoint/2015/09/main">
+    <mc:Choice Requires="p159">
       <p:transition xmlns:p14="http://schemas.microsoft.com/office/powerpoint/2010/main" spd="slow" p14:dur="2000">
         <p159:morph option="byObject"/>
       </p:transition>
     </mc:Choice>
-    <mc:Fallback>
+    <mc:Fallback xmlns="">
       <p:transition spd="slow">
         <p:fade/>
       </p:transition>
@@ -1893,7 +1902,7 @@
           <a:p>
             <a:fld id="{49DD5F41-4351-1F47-B7E8-36D0C8A1DD6D}" type="datetimeFigureOut">
               <a:rPr lang="en-US" smtClean="0"/>
-              <a:t>9/26/23</a:t>
+              <a:t>9/28/23</a:t>
             </a:fld>
             <a:endParaRPr lang="en-US"/>
           </a:p>
@@ -1963,13 +1972,13 @@
   <p:clrMapOvr>
     <a:masterClrMapping/>
   </p:clrMapOvr>
-  <mc:AlternateContent xmlns:mc="http://schemas.openxmlformats.org/markup-compatibility/2006">
-    <mc:Choice xmlns:p159="http://schemas.microsoft.com/office/powerpoint/2015/09/main" Requires="p159">
+  <mc:AlternateContent xmlns:mc="http://schemas.openxmlformats.org/markup-compatibility/2006" xmlns:p159="http://schemas.microsoft.com/office/powerpoint/2015/09/main">
+    <mc:Choice Requires="p159">
       <p:transition xmlns:p14="http://schemas.microsoft.com/office/powerpoint/2010/main" spd="slow" p14:dur="2000">
         <p159:morph option="byObject"/>
       </p:transition>
     </mc:Choice>
-    <mc:Fallback>
+    <mc:Fallback xmlns="">
       <p:transition spd="slow">
         <p:fade/>
       </p:transition>
@@ -2046,7 +2055,7 @@
           <a:p>
             <a:fld id="{49DD5F41-4351-1F47-B7E8-36D0C8A1DD6D}" type="datetimeFigureOut">
               <a:rPr lang="en-US" smtClean="0"/>
-              <a:t>9/26/23</a:t>
+              <a:t>9/28/23</a:t>
             </a:fld>
             <a:endParaRPr lang="en-US"/>
           </a:p>
@@ -2116,13 +2125,13 @@
   <p:clrMapOvr>
     <a:masterClrMapping/>
   </p:clrMapOvr>
-  <mc:AlternateContent xmlns:mc="http://schemas.openxmlformats.org/markup-compatibility/2006">
-    <mc:Choice xmlns:p159="http://schemas.microsoft.com/office/powerpoint/2015/09/main" Requires="p159">
+  <mc:AlternateContent xmlns:mc="http://schemas.openxmlformats.org/markup-compatibility/2006" xmlns:p159="http://schemas.microsoft.com/office/powerpoint/2015/09/main">
+    <mc:Choice Requires="p159">
       <p:transition xmlns:p14="http://schemas.microsoft.com/office/powerpoint/2010/main" spd="slow" p14:dur="2000">
         <p159:morph option="byObject"/>
       </p:transition>
     </mc:Choice>
-    <mc:Fallback>
+    <mc:Fallback xmlns="">
       <p:transition spd="slow">
         <p:fade/>
       </p:transition>
@@ -2171,7 +2180,7 @@
           <a:p>
             <a:fld id="{49DD5F41-4351-1F47-B7E8-36D0C8A1DD6D}" type="datetimeFigureOut">
               <a:rPr lang="en-US" smtClean="0"/>
-              <a:t>9/26/23</a:t>
+              <a:t>9/28/23</a:t>
             </a:fld>
             <a:endParaRPr lang="en-US"/>
           </a:p>
@@ -2241,13 +2250,13 @@
   <p:clrMapOvr>
     <a:masterClrMapping/>
   </p:clrMapOvr>
-  <mc:AlternateContent xmlns:mc="http://schemas.openxmlformats.org/markup-compatibility/2006">
-    <mc:Choice xmlns:p159="http://schemas.microsoft.com/office/powerpoint/2015/09/main" Requires="p159">
+  <mc:AlternateContent xmlns:mc="http://schemas.openxmlformats.org/markup-compatibility/2006" xmlns:p159="http://schemas.microsoft.com/office/powerpoint/2015/09/main">
+    <mc:Choice Requires="p159">
       <p:transition xmlns:p14="http://schemas.microsoft.com/office/powerpoint/2010/main" spd="slow" p14:dur="2000">
         <p159:morph option="byObject"/>
       </p:transition>
     </mc:Choice>
-    <mc:Fallback>
+    <mc:Fallback xmlns="">
       <p:transition spd="slow">
         <p:fade/>
       </p:transition>
@@ -2494,7 +2503,7 @@
           <a:p>
             <a:fld id="{49DD5F41-4351-1F47-B7E8-36D0C8A1DD6D}" type="datetimeFigureOut">
               <a:rPr lang="en-US" smtClean="0"/>
-              <a:t>9/26/23</a:t>
+              <a:t>9/28/23</a:t>
             </a:fld>
             <a:endParaRPr lang="en-US"/>
           </a:p>
@@ -2564,13 +2573,13 @@
   <p:clrMapOvr>
     <a:masterClrMapping/>
   </p:clrMapOvr>
-  <mc:AlternateContent xmlns:mc="http://schemas.openxmlformats.org/markup-compatibility/2006">
-    <mc:Choice xmlns:p159="http://schemas.microsoft.com/office/powerpoint/2015/09/main" Requires="p159">
+  <mc:AlternateContent xmlns:mc="http://schemas.openxmlformats.org/markup-compatibility/2006" xmlns:p159="http://schemas.microsoft.com/office/powerpoint/2015/09/main">
+    <mc:Choice Requires="p159">
       <p:transition xmlns:p14="http://schemas.microsoft.com/office/powerpoint/2010/main" spd="slow" p14:dur="2000">
         <p159:morph option="byObject"/>
       </p:transition>
     </mc:Choice>
-    <mc:Fallback>
+    <mc:Fallback xmlns="">
       <p:transition spd="slow">
         <p:fade/>
       </p:transition>
@@ -2794,7 +2803,7 @@
           <a:p>
             <a:fld id="{49DD5F41-4351-1F47-B7E8-36D0C8A1DD6D}" type="datetimeFigureOut">
               <a:rPr lang="en-US" smtClean="0"/>
-              <a:t>9/26/23</a:t>
+              <a:t>9/28/23</a:t>
             </a:fld>
             <a:endParaRPr lang="en-US"/>
           </a:p>
@@ -2864,13 +2873,13 @@
   <p:clrMapOvr>
     <a:masterClrMapping/>
   </p:clrMapOvr>
-  <mc:AlternateContent xmlns:mc="http://schemas.openxmlformats.org/markup-compatibility/2006">
-    <mc:Choice xmlns:p159="http://schemas.microsoft.com/office/powerpoint/2015/09/main" Requires="p159">
+  <mc:AlternateContent xmlns:mc="http://schemas.openxmlformats.org/markup-compatibility/2006" xmlns:p159="http://schemas.microsoft.com/office/powerpoint/2015/09/main">
+    <mc:Choice Requires="p159">
       <p:transition xmlns:p14="http://schemas.microsoft.com/office/powerpoint/2010/main" spd="slow" p14:dur="2000">
         <p159:morph option="byObject"/>
       </p:transition>
     </mc:Choice>
-    <mc:Fallback>
+    <mc:Fallback xmlns="">
       <p:transition spd="slow">
         <p:fade/>
       </p:transition>
@@ -3047,7 +3056,7 @@
           <a:p>
             <a:fld id="{49DD5F41-4351-1F47-B7E8-36D0C8A1DD6D}" type="datetimeFigureOut">
               <a:rPr lang="en-US" smtClean="0"/>
-              <a:t>9/26/23</a:t>
+              <a:t>9/28/23</a:t>
             </a:fld>
             <a:endParaRPr lang="en-US"/>
           </a:p>
@@ -3164,13 +3173,13 @@
     <p:sldLayoutId id="2147483658" r:id="rId10"/>
     <p:sldLayoutId id="2147483659" r:id="rId11"/>
   </p:sldLayoutIdLst>
-  <mc:AlternateContent xmlns:mc="http://schemas.openxmlformats.org/markup-compatibility/2006">
-    <mc:Choice xmlns:p159="http://schemas.microsoft.com/office/powerpoint/2015/09/main" Requires="p159">
+  <mc:AlternateContent xmlns:mc="http://schemas.openxmlformats.org/markup-compatibility/2006" xmlns:p159="http://schemas.microsoft.com/office/powerpoint/2015/09/main">
+    <mc:Choice Requires="p159">
       <p:transition xmlns:p14="http://schemas.microsoft.com/office/powerpoint/2010/main" spd="slow" p14:dur="2000">
         <p159:morph option="byObject"/>
       </p:transition>
     </mc:Choice>
-    <mc:Fallback>
+    <mc:Fallback xmlns="">
       <p:transition spd="slow">
         <p:fade/>
       </p:transition>
@@ -3596,13 +3605,13 @@
   <p:clrMapOvr>
     <a:masterClrMapping/>
   </p:clrMapOvr>
-  <mc:AlternateContent xmlns:mc="http://schemas.openxmlformats.org/markup-compatibility/2006">
-    <mc:Choice xmlns:p159="http://schemas.microsoft.com/office/powerpoint/2015/09/main" Requires="p159">
+  <mc:AlternateContent xmlns:mc="http://schemas.openxmlformats.org/markup-compatibility/2006" xmlns:p159="http://schemas.microsoft.com/office/powerpoint/2015/09/main">
+    <mc:Choice Requires="p159">
       <p:transition xmlns:p14="http://schemas.microsoft.com/office/powerpoint/2010/main" spd="slow" p14:dur="2000">
         <p159:morph option="byObject"/>
       </p:transition>
     </mc:Choice>
-    <mc:Fallback>
+    <mc:Fallback xmlns="">
       <p:transition spd="slow">
         <p:fade/>
       </p:transition>
@@ -3668,13 +3677,13 @@
   <p:clrMapOvr>
     <a:masterClrMapping/>
   </p:clrMapOvr>
-  <mc:AlternateContent xmlns:mc="http://schemas.openxmlformats.org/markup-compatibility/2006">
-    <mc:Choice xmlns:p159="http://schemas.microsoft.com/office/powerpoint/2015/09/main" Requires="p159">
+  <mc:AlternateContent xmlns:mc="http://schemas.openxmlformats.org/markup-compatibility/2006" xmlns:p159="http://schemas.microsoft.com/office/powerpoint/2015/09/main">
+    <mc:Choice Requires="p159">
       <p:transition xmlns:p14="http://schemas.microsoft.com/office/powerpoint/2010/main" spd="slow" p14:dur="2000">
         <p159:morph option="byObject"/>
       </p:transition>
     </mc:Choice>
-    <mc:Fallback>
+    <mc:Fallback xmlns="">
       <p:transition spd="slow">
         <p:fade/>
       </p:transition>
@@ -3822,13 +3831,13 @@
   <p:clrMapOvr>
     <a:masterClrMapping/>
   </p:clrMapOvr>
-  <mc:AlternateContent xmlns:mc="http://schemas.openxmlformats.org/markup-compatibility/2006">
-    <mc:Choice xmlns:p159="http://schemas.microsoft.com/office/powerpoint/2015/09/main" Requires="p159">
+  <mc:AlternateContent xmlns:mc="http://schemas.openxmlformats.org/markup-compatibility/2006" xmlns:p159="http://schemas.microsoft.com/office/powerpoint/2015/09/main">
+    <mc:Choice Requires="p159">
       <p:transition xmlns:p14="http://schemas.microsoft.com/office/powerpoint/2010/main" spd="slow" p14:dur="2000">
         <p159:morph option="byObject"/>
       </p:transition>
     </mc:Choice>
-    <mc:Fallback>
+    <mc:Fallback xmlns="">
       <p:transition spd="slow">
         <p:fade/>
       </p:transition>
@@ -3854,10 +3863,240 @@
           <a:chExt cx="0" cy="0"/>
         </a:xfrm>
       </p:grpSpPr>
+      <p:pic>
+        <p:nvPicPr>
+          <p:cNvPr id="2" name="Picture 1">
+            <a:extLst>
+              <a:ext uri="{FF2B5EF4-FFF2-40B4-BE49-F238E27FC236}">
+                <a16:creationId xmlns:a16="http://schemas.microsoft.com/office/drawing/2014/main" id="{3F99AF86-F778-70CA-B120-3C481412531C}"/>
+              </a:ext>
+            </a:extLst>
+          </p:cNvPr>
+          <p:cNvPicPr>
+            <a:picLocks noChangeAspect="1"/>
+          </p:cNvPicPr>
+          <p:nvPr/>
+        </p:nvPicPr>
+        <p:blipFill>
+          <a:blip r:embed="rId2"/>
+          <a:stretch>
+            <a:fillRect/>
+          </a:stretch>
+        </p:blipFill>
+        <p:spPr>
+          <a:xfrm>
+            <a:off x="2209800" y="327063"/>
+            <a:ext cx="7772400" cy="6203873"/>
+          </a:xfrm>
+          <a:prstGeom prst="rect">
+            <a:avLst/>
+          </a:prstGeom>
+        </p:spPr>
+      </p:pic>
+      <p:sp>
+        <p:nvSpPr>
+          <p:cNvPr id="3" name="TextBox 2">
+            <a:extLst>
+              <a:ext uri="{FF2B5EF4-FFF2-40B4-BE49-F238E27FC236}">
+                <a16:creationId xmlns:a16="http://schemas.microsoft.com/office/drawing/2014/main" id="{AAC4DCAC-6C6B-30C1-EAD7-250CF63FC796}"/>
+              </a:ext>
+            </a:extLst>
+          </p:cNvPr>
+          <p:cNvSpPr txBox="1"/>
+          <p:nvPr/>
+        </p:nvSpPr>
+        <p:spPr>
+          <a:xfrm>
+            <a:off x="89647" y="277906"/>
+            <a:ext cx="1725426" cy="738664"/>
+          </a:xfrm>
+          <a:prstGeom prst="rect">
+            <a:avLst/>
+          </a:prstGeom>
+          <a:noFill/>
+        </p:spPr>
+        <p:txBody>
+          <a:bodyPr wrap="square" rtlCol="0">
+            <a:spAutoFit/>
+          </a:bodyPr>
+          <a:lstStyle/>
+          <a:p>
+            <a:r>
+              <a:rPr lang="en-US" sz="1400" dirty="0"/>
+              <a:t>Cost and Strikes Dashboard</a:t>
+            </a:r>
+          </a:p>
+          <a:p>
+            <a:endParaRPr lang="en-US" sz="1400" dirty="0"/>
+          </a:p>
+        </p:txBody>
+      </p:sp>
     </p:spTree>
     <p:extLst>
       <p:ext uri="{BB962C8B-B14F-4D97-AF65-F5344CB8AC3E}">
         <p14:creationId xmlns:p14="http://schemas.microsoft.com/office/powerpoint/2010/main" val="2913674010"/>
+      </p:ext>
+    </p:extLst>
+  </p:cSld>
+  <p:clrMapOvr>
+    <a:masterClrMapping/>
+  </p:clrMapOvr>
+  <mc:AlternateContent xmlns:mc="http://schemas.openxmlformats.org/markup-compatibility/2006" xmlns:p159="http://schemas.microsoft.com/office/powerpoint/2015/09/main">
+    <mc:Choice Requires="p159">
+      <p:transition xmlns:p14="http://schemas.microsoft.com/office/powerpoint/2010/main" spd="slow" p14:dur="2000">
+        <p159:morph option="byObject"/>
+      </p:transition>
+    </mc:Choice>
+    <mc:Fallback xmlns="">
+      <p:transition spd="slow">
+        <p:fade/>
+      </p:transition>
+    </mc:Fallback>
+  </mc:AlternateContent>
+</p:sld>
+</file>
+
+<file path=ppt/slides/slide13.xml><?xml version="1.0" encoding="utf-8"?>
+<p:sld xmlns:a="http://schemas.openxmlformats.org/drawingml/2006/main" xmlns:r="http://schemas.openxmlformats.org/officeDocument/2006/relationships" xmlns:p="http://schemas.openxmlformats.org/presentationml/2006/main">
+  <p:cSld>
+    <p:spTree>
+      <p:nvGrpSpPr>
+        <p:cNvPr id="1" name=""/>
+        <p:cNvGrpSpPr/>
+        <p:nvPr/>
+      </p:nvGrpSpPr>
+      <p:grpSpPr>
+        <a:xfrm>
+          <a:off x="0" y="0"/>
+          <a:ext cx="0" cy="0"/>
+          <a:chOff x="0" y="0"/>
+          <a:chExt cx="0" cy="0"/>
+        </a:xfrm>
+      </p:grpSpPr>
+      <p:pic>
+        <p:nvPicPr>
+          <p:cNvPr id="2" name="Picture 1">
+            <a:extLst>
+              <a:ext uri="{FF2B5EF4-FFF2-40B4-BE49-F238E27FC236}">
+                <a16:creationId xmlns:a16="http://schemas.microsoft.com/office/drawing/2014/main" id="{3F99AF86-F778-70CA-B120-3C481412531C}"/>
+              </a:ext>
+            </a:extLst>
+          </p:cNvPr>
+          <p:cNvPicPr>
+            <a:picLocks noChangeAspect="1"/>
+          </p:cNvPicPr>
+          <p:nvPr/>
+        </p:nvPicPr>
+        <p:blipFill>
+          <a:blip r:embed="rId2"/>
+          <a:stretch>
+            <a:fillRect/>
+          </a:stretch>
+        </p:blipFill>
+        <p:spPr>
+          <a:xfrm>
+            <a:off x="2209800" y="327063"/>
+            <a:ext cx="7772400" cy="6203873"/>
+          </a:xfrm>
+          <a:prstGeom prst="rect">
+            <a:avLst/>
+          </a:prstGeom>
+        </p:spPr>
+      </p:pic>
+      <p:sp>
+        <p:nvSpPr>
+          <p:cNvPr id="3" name="TextBox 2">
+            <a:extLst>
+              <a:ext uri="{FF2B5EF4-FFF2-40B4-BE49-F238E27FC236}">
+                <a16:creationId xmlns:a16="http://schemas.microsoft.com/office/drawing/2014/main" id="{AAC4DCAC-6C6B-30C1-EAD7-250CF63FC796}"/>
+              </a:ext>
+            </a:extLst>
+          </p:cNvPr>
+          <p:cNvSpPr txBox="1"/>
+          <p:nvPr/>
+        </p:nvSpPr>
+        <p:spPr>
+          <a:xfrm>
+            <a:off x="89647" y="277906"/>
+            <a:ext cx="1725426" cy="1384995"/>
+          </a:xfrm>
+          <a:prstGeom prst="rect">
+            <a:avLst/>
+          </a:prstGeom>
+          <a:noFill/>
+        </p:spPr>
+        <p:txBody>
+          <a:bodyPr wrap="square" rtlCol="0">
+            <a:spAutoFit/>
+          </a:bodyPr>
+          <a:lstStyle/>
+          <a:p>
+            <a:r>
+              <a:rPr lang="en-US" sz="1400" dirty="0"/>
+              <a:t>Depicted by the blue bar, 2009 has the highest reported aircraft cost inflicted by engine strikes.</a:t>
+            </a:r>
+          </a:p>
+          <a:p>
+            <a:endParaRPr lang="en-US" sz="1400" dirty="0"/>
+          </a:p>
+        </p:txBody>
+      </p:sp>
+      <p:sp>
+        <p:nvSpPr>
+          <p:cNvPr id="5" name="Rectangle 4">
+            <a:extLst>
+              <a:ext uri="{FF2B5EF4-FFF2-40B4-BE49-F238E27FC236}">
+                <a16:creationId xmlns:a16="http://schemas.microsoft.com/office/drawing/2014/main" id="{517A666B-AAF6-209A-4827-00BCB60A2D79}"/>
+              </a:ext>
+            </a:extLst>
+          </p:cNvPr>
+          <p:cNvSpPr/>
+          <p:nvPr/>
+        </p:nvSpPr>
+        <p:spPr>
+          <a:xfrm>
+            <a:off x="5638800" y="1111624"/>
+            <a:ext cx="609599" cy="3065929"/>
+          </a:xfrm>
+          <a:prstGeom prst="rect">
+            <a:avLst/>
+          </a:prstGeom>
+          <a:noFill/>
+          <a:ln w="38100">
+            <a:solidFill>
+              <a:srgbClr val="FF0000"/>
+            </a:solidFill>
+          </a:ln>
+        </p:spPr>
+        <p:style>
+          <a:lnRef idx="2">
+            <a:schemeClr val="accent1">
+              <a:shade val="15000"/>
+            </a:schemeClr>
+          </a:lnRef>
+          <a:fillRef idx="1">
+            <a:schemeClr val="accent1"/>
+          </a:fillRef>
+          <a:effectRef idx="0">
+            <a:schemeClr val="accent1"/>
+          </a:effectRef>
+          <a:fontRef idx="minor">
+            <a:schemeClr val="lt1"/>
+          </a:fontRef>
+        </p:style>
+        <p:txBody>
+          <a:bodyPr rtlCol="0" anchor="ctr"/>
+          <a:lstStyle/>
+          <a:p>
+            <a:pPr algn="ctr"/>
+            <a:endParaRPr lang="en-US"/>
+          </a:p>
+        </p:txBody>
+      </p:sp>
+    </p:spTree>
+    <p:extLst>
+      <p:ext uri="{BB962C8B-B14F-4D97-AF65-F5344CB8AC3E}">
+        <p14:creationId xmlns:p14="http://schemas.microsoft.com/office/powerpoint/2010/main" val="3882921878"/>
       </p:ext>
     </p:extLst>
   </p:cSld>
@@ -3871,6 +4110,447 @@
       </p:transition>
     </mc:Choice>
     <mc:Fallback>
+      <p:transition spd="slow">
+        <p:fade/>
+      </p:transition>
+    </mc:Fallback>
+  </mc:AlternateContent>
+</p:sld>
+</file>
+
+<file path=ppt/slides/slide14.xml><?xml version="1.0" encoding="utf-8"?>
+<p:sld xmlns:a="http://schemas.openxmlformats.org/drawingml/2006/main" xmlns:r="http://schemas.openxmlformats.org/officeDocument/2006/relationships" xmlns:p="http://schemas.openxmlformats.org/presentationml/2006/main">
+  <p:cSld>
+    <p:spTree>
+      <p:nvGrpSpPr>
+        <p:cNvPr id="1" name=""/>
+        <p:cNvGrpSpPr/>
+        <p:nvPr/>
+      </p:nvGrpSpPr>
+      <p:grpSpPr>
+        <a:xfrm>
+          <a:off x="0" y="0"/>
+          <a:ext cx="0" cy="0"/>
+          <a:chOff x="0" y="0"/>
+          <a:chExt cx="0" cy="0"/>
+        </a:xfrm>
+      </p:grpSpPr>
+      <p:pic>
+        <p:nvPicPr>
+          <p:cNvPr id="2" name="Picture 1">
+            <a:extLst>
+              <a:ext uri="{FF2B5EF4-FFF2-40B4-BE49-F238E27FC236}">
+                <a16:creationId xmlns:a16="http://schemas.microsoft.com/office/drawing/2014/main" id="{3F99AF86-F778-70CA-B120-3C481412531C}"/>
+              </a:ext>
+            </a:extLst>
+          </p:cNvPr>
+          <p:cNvPicPr>
+            <a:picLocks noChangeAspect="1"/>
+          </p:cNvPicPr>
+          <p:nvPr/>
+        </p:nvPicPr>
+        <p:blipFill>
+          <a:blip r:embed="rId2"/>
+          <a:stretch>
+            <a:fillRect/>
+          </a:stretch>
+        </p:blipFill>
+        <p:spPr>
+          <a:xfrm>
+            <a:off x="2209800" y="327063"/>
+            <a:ext cx="7772400" cy="6203873"/>
+          </a:xfrm>
+          <a:prstGeom prst="rect">
+            <a:avLst/>
+          </a:prstGeom>
+        </p:spPr>
+      </p:pic>
+      <p:sp>
+        <p:nvSpPr>
+          <p:cNvPr id="3" name="TextBox 2">
+            <a:extLst>
+              <a:ext uri="{FF2B5EF4-FFF2-40B4-BE49-F238E27FC236}">
+                <a16:creationId xmlns:a16="http://schemas.microsoft.com/office/drawing/2014/main" id="{AAC4DCAC-6C6B-30C1-EAD7-250CF63FC796}"/>
+              </a:ext>
+            </a:extLst>
+          </p:cNvPr>
+          <p:cNvSpPr txBox="1"/>
+          <p:nvPr/>
+        </p:nvSpPr>
+        <p:spPr>
+          <a:xfrm>
+            <a:off x="89647" y="277906"/>
+            <a:ext cx="1725426" cy="1600438"/>
+          </a:xfrm>
+          <a:prstGeom prst="rect">
+            <a:avLst/>
+          </a:prstGeom>
+          <a:noFill/>
+        </p:spPr>
+        <p:txBody>
+          <a:bodyPr wrap="square" rtlCol="0">
+            <a:spAutoFit/>
+          </a:bodyPr>
+          <a:lstStyle/>
+          <a:p>
+            <a:r>
+              <a:rPr lang="en-US" sz="1400" dirty="0"/>
+              <a:t>Although with less than $20M cost of aircraft damages, 2014 has the highest reported number of engine strikes.</a:t>
+            </a:r>
+          </a:p>
+          <a:p>
+            <a:endParaRPr lang="en-US" sz="1400" dirty="0"/>
+          </a:p>
+        </p:txBody>
+      </p:sp>
+      <p:sp>
+        <p:nvSpPr>
+          <p:cNvPr id="5" name="Rectangle 4">
+            <a:extLst>
+              <a:ext uri="{FF2B5EF4-FFF2-40B4-BE49-F238E27FC236}">
+                <a16:creationId xmlns:a16="http://schemas.microsoft.com/office/drawing/2014/main" id="{517A666B-AAF6-209A-4827-00BCB60A2D79}"/>
+              </a:ext>
+            </a:extLst>
+          </p:cNvPr>
+          <p:cNvSpPr/>
+          <p:nvPr/>
+        </p:nvSpPr>
+        <p:spPr>
+          <a:xfrm>
+            <a:off x="7270376" y="1120588"/>
+            <a:ext cx="609599" cy="3065929"/>
+          </a:xfrm>
+          <a:prstGeom prst="rect">
+            <a:avLst/>
+          </a:prstGeom>
+          <a:noFill/>
+          <a:ln w="38100">
+            <a:solidFill>
+              <a:srgbClr val="FF0000"/>
+            </a:solidFill>
+          </a:ln>
+        </p:spPr>
+        <p:style>
+          <a:lnRef idx="2">
+            <a:schemeClr val="accent1">
+              <a:shade val="15000"/>
+            </a:schemeClr>
+          </a:lnRef>
+          <a:fillRef idx="1">
+            <a:schemeClr val="accent1"/>
+          </a:fillRef>
+          <a:effectRef idx="0">
+            <a:schemeClr val="accent1"/>
+          </a:effectRef>
+          <a:fontRef idx="minor">
+            <a:schemeClr val="lt1"/>
+          </a:fontRef>
+        </p:style>
+        <p:txBody>
+          <a:bodyPr rtlCol="0" anchor="ctr"/>
+          <a:lstStyle/>
+          <a:p>
+            <a:pPr algn="ctr"/>
+            <a:endParaRPr lang="en-US"/>
+          </a:p>
+        </p:txBody>
+      </p:sp>
+    </p:spTree>
+    <p:extLst>
+      <p:ext uri="{BB962C8B-B14F-4D97-AF65-F5344CB8AC3E}">
+        <p14:creationId xmlns:p14="http://schemas.microsoft.com/office/powerpoint/2010/main" val="3954476160"/>
+      </p:ext>
+    </p:extLst>
+  </p:cSld>
+  <p:clrMapOvr>
+    <a:masterClrMapping/>
+  </p:clrMapOvr>
+  <mc:AlternateContent xmlns:mc="http://schemas.openxmlformats.org/markup-compatibility/2006">
+    <mc:Choice xmlns:p159="http://schemas.microsoft.com/office/powerpoint/2015/09/main" Requires="p159">
+      <p:transition xmlns:p14="http://schemas.microsoft.com/office/powerpoint/2010/main" spd="slow" p14:dur="2000">
+        <p159:morph option="byObject"/>
+      </p:transition>
+    </mc:Choice>
+    <mc:Fallback>
+      <p:transition spd="slow">
+        <p:fade/>
+      </p:transition>
+    </mc:Fallback>
+  </mc:AlternateContent>
+</p:sld>
+</file>
+
+<file path=ppt/slides/slide15.xml><?xml version="1.0" encoding="utf-8"?>
+<p:sld xmlns:a="http://schemas.openxmlformats.org/drawingml/2006/main" xmlns:r="http://schemas.openxmlformats.org/officeDocument/2006/relationships" xmlns:p="http://schemas.openxmlformats.org/presentationml/2006/main">
+  <p:cSld>
+    <p:spTree>
+      <p:nvGrpSpPr>
+        <p:cNvPr id="1" name=""/>
+        <p:cNvGrpSpPr/>
+        <p:nvPr/>
+      </p:nvGrpSpPr>
+      <p:grpSpPr>
+        <a:xfrm>
+          <a:off x="0" y="0"/>
+          <a:ext cx="0" cy="0"/>
+          <a:chOff x="0" y="0"/>
+          <a:chExt cx="0" cy="0"/>
+        </a:xfrm>
+      </p:grpSpPr>
+      <p:pic>
+        <p:nvPicPr>
+          <p:cNvPr id="2" name="Picture 1">
+            <a:extLst>
+              <a:ext uri="{FF2B5EF4-FFF2-40B4-BE49-F238E27FC236}">
+                <a16:creationId xmlns:a16="http://schemas.microsoft.com/office/drawing/2014/main" id="{3F99AF86-F778-70CA-B120-3C481412531C}"/>
+              </a:ext>
+            </a:extLst>
+          </p:cNvPr>
+          <p:cNvPicPr>
+            <a:picLocks noChangeAspect="1"/>
+          </p:cNvPicPr>
+          <p:nvPr/>
+        </p:nvPicPr>
+        <p:blipFill>
+          <a:blip r:embed="rId2"/>
+          <a:stretch>
+            <a:fillRect/>
+          </a:stretch>
+        </p:blipFill>
+        <p:spPr>
+          <a:xfrm>
+            <a:off x="2209800" y="327063"/>
+            <a:ext cx="7772400" cy="6203873"/>
+          </a:xfrm>
+          <a:prstGeom prst="rect">
+            <a:avLst/>
+          </a:prstGeom>
+        </p:spPr>
+      </p:pic>
+      <p:sp>
+        <p:nvSpPr>
+          <p:cNvPr id="3" name="TextBox 2">
+            <a:extLst>
+              <a:ext uri="{FF2B5EF4-FFF2-40B4-BE49-F238E27FC236}">
+                <a16:creationId xmlns:a16="http://schemas.microsoft.com/office/drawing/2014/main" id="{AAC4DCAC-6C6B-30C1-EAD7-250CF63FC796}"/>
+              </a:ext>
+            </a:extLst>
+          </p:cNvPr>
+          <p:cNvSpPr txBox="1"/>
+          <p:nvPr/>
+        </p:nvSpPr>
+        <p:spPr>
+          <a:xfrm>
+            <a:off x="89647" y="277906"/>
+            <a:ext cx="1725426" cy="3108543"/>
+          </a:xfrm>
+          <a:prstGeom prst="rect">
+            <a:avLst/>
+          </a:prstGeom>
+          <a:noFill/>
+        </p:spPr>
+        <p:txBody>
+          <a:bodyPr wrap="square" rtlCol="0">
+            <a:spAutoFit/>
+          </a:bodyPr>
+          <a:lstStyle/>
+          <a:p>
+            <a:r>
+              <a:rPr lang="en-US" sz="1400" dirty="0"/>
+              <a:t>Comparing the two states, New York has the highest overall total cost in aircraft damages inflicted by engine strikes. </a:t>
+            </a:r>
+          </a:p>
+          <a:p>
+            <a:endParaRPr lang="en-US" sz="1400" dirty="0"/>
+          </a:p>
+          <a:p>
+            <a:r>
+              <a:rPr lang="en-US" sz="1400" dirty="0"/>
+              <a:t>However, it is the state of California which have the most number of reported aircraft engine strikes.</a:t>
+            </a:r>
+          </a:p>
+          <a:p>
+            <a:endParaRPr lang="en-US" sz="1400" dirty="0"/>
+          </a:p>
+        </p:txBody>
+      </p:sp>
+      <p:sp>
+        <p:nvSpPr>
+          <p:cNvPr id="5" name="Rectangle 4">
+            <a:extLst>
+              <a:ext uri="{FF2B5EF4-FFF2-40B4-BE49-F238E27FC236}">
+                <a16:creationId xmlns:a16="http://schemas.microsoft.com/office/drawing/2014/main" id="{517A666B-AAF6-209A-4827-00BCB60A2D79}"/>
+              </a:ext>
+            </a:extLst>
+          </p:cNvPr>
+          <p:cNvSpPr/>
+          <p:nvPr/>
+        </p:nvSpPr>
+        <p:spPr>
+          <a:xfrm>
+            <a:off x="2209800" y="4482353"/>
+            <a:ext cx="7848600" cy="502499"/>
+          </a:xfrm>
+          <a:prstGeom prst="rect">
+            <a:avLst/>
+          </a:prstGeom>
+          <a:noFill/>
+          <a:ln w="38100">
+            <a:solidFill>
+              <a:srgbClr val="FF0000"/>
+            </a:solidFill>
+          </a:ln>
+        </p:spPr>
+        <p:style>
+          <a:lnRef idx="2">
+            <a:schemeClr val="accent1">
+              <a:shade val="15000"/>
+            </a:schemeClr>
+          </a:lnRef>
+          <a:fillRef idx="1">
+            <a:schemeClr val="accent1"/>
+          </a:fillRef>
+          <a:effectRef idx="0">
+            <a:schemeClr val="accent1"/>
+          </a:effectRef>
+          <a:fontRef idx="minor">
+            <a:schemeClr val="lt1"/>
+          </a:fontRef>
+        </p:style>
+        <p:txBody>
+          <a:bodyPr rtlCol="0" anchor="ctr"/>
+          <a:lstStyle/>
+          <a:p>
+            <a:pPr algn="ctr"/>
+            <a:endParaRPr lang="en-US"/>
+          </a:p>
+        </p:txBody>
+      </p:sp>
+    </p:spTree>
+    <p:extLst>
+      <p:ext uri="{BB962C8B-B14F-4D97-AF65-F5344CB8AC3E}">
+        <p14:creationId xmlns:p14="http://schemas.microsoft.com/office/powerpoint/2010/main" val="665816905"/>
+      </p:ext>
+    </p:extLst>
+  </p:cSld>
+  <p:clrMapOvr>
+    <a:masterClrMapping/>
+  </p:clrMapOvr>
+  <mc:AlternateContent xmlns:mc="http://schemas.openxmlformats.org/markup-compatibility/2006">
+    <mc:Choice xmlns:p159="http://schemas.microsoft.com/office/powerpoint/2015/09/main" Requires="p159">
+      <p:transition xmlns:p14="http://schemas.microsoft.com/office/powerpoint/2010/main" spd="slow" p14:dur="2000">
+        <p159:morph option="byObject"/>
+      </p:transition>
+    </mc:Choice>
+    <mc:Fallback>
+      <p:transition spd="slow">
+        <p:fade/>
+      </p:transition>
+    </mc:Fallback>
+  </mc:AlternateContent>
+</p:sld>
+</file>
+
+<file path=ppt/slides/slide16.xml><?xml version="1.0" encoding="utf-8"?>
+<p:sld xmlns:a="http://schemas.openxmlformats.org/drawingml/2006/main" xmlns:r="http://schemas.openxmlformats.org/officeDocument/2006/relationships" xmlns:p="http://schemas.openxmlformats.org/presentationml/2006/main">
+  <p:cSld>
+    <p:spTree>
+      <p:nvGrpSpPr>
+        <p:cNvPr id="1" name=""/>
+        <p:cNvGrpSpPr/>
+        <p:nvPr/>
+      </p:nvGrpSpPr>
+      <p:grpSpPr>
+        <a:xfrm>
+          <a:off x="0" y="0"/>
+          <a:ext cx="0" cy="0"/>
+          <a:chOff x="0" y="0"/>
+          <a:chExt cx="0" cy="0"/>
+        </a:xfrm>
+      </p:grpSpPr>
+      <p:sp>
+        <p:nvSpPr>
+          <p:cNvPr id="2" name="Title 1">
+            <a:extLst>
+              <a:ext uri="{FF2B5EF4-FFF2-40B4-BE49-F238E27FC236}">
+                <a16:creationId xmlns:a16="http://schemas.microsoft.com/office/drawing/2014/main" id="{13C5E0DB-B452-9C94-FE9C-D12F80F5E0D4}"/>
+              </a:ext>
+            </a:extLst>
+          </p:cNvPr>
+          <p:cNvSpPr>
+            <a:spLocks noGrp="1"/>
+          </p:cNvSpPr>
+          <p:nvPr>
+            <p:ph type="title"/>
+          </p:nvPr>
+        </p:nvSpPr>
+        <p:spPr>
+          <a:xfrm>
+            <a:off x="838200" y="365125"/>
+            <a:ext cx="10515600" cy="701675"/>
+          </a:xfrm>
+        </p:spPr>
+        <p:txBody>
+          <a:bodyPr/>
+          <a:lstStyle/>
+          <a:p>
+            <a:r>
+              <a:rPr lang="en-US" dirty="0"/>
+              <a:t>Key Insights</a:t>
+            </a:r>
+          </a:p>
+        </p:txBody>
+      </p:sp>
+      <p:sp>
+        <p:nvSpPr>
+          <p:cNvPr id="3" name="Content Placeholder 2">
+            <a:extLst>
+              <a:ext uri="{FF2B5EF4-FFF2-40B4-BE49-F238E27FC236}">
+                <a16:creationId xmlns:a16="http://schemas.microsoft.com/office/drawing/2014/main" id="{72F20DC2-3EF2-19FB-E995-A2714B48CC24}"/>
+              </a:ext>
+            </a:extLst>
+          </p:cNvPr>
+          <p:cNvSpPr>
+            <a:spLocks noGrp="1"/>
+          </p:cNvSpPr>
+          <p:nvPr>
+            <p:ph idx="1"/>
+          </p:nvPr>
+        </p:nvSpPr>
+        <p:spPr>
+          <a:xfrm>
+            <a:off x="838200" y="1228165"/>
+            <a:ext cx="5535706" cy="4948798"/>
+          </a:xfrm>
+        </p:spPr>
+        <p:txBody>
+          <a:bodyPr/>
+          <a:lstStyle/>
+          <a:p>
+            <a:r>
+              <a:rPr lang="en-US" dirty="0"/>
+              <a:t>California has </a:t>
+            </a:r>
+          </a:p>
+        </p:txBody>
+      </p:sp>
+    </p:spTree>
+    <p:extLst>
+      <p:ext uri="{BB962C8B-B14F-4D97-AF65-F5344CB8AC3E}">
+        <p14:creationId xmlns:p14="http://schemas.microsoft.com/office/powerpoint/2010/main" val="2924098433"/>
+      </p:ext>
+    </p:extLst>
+  </p:cSld>
+  <p:clrMapOvr>
+    <a:masterClrMapping/>
+  </p:clrMapOvr>
+  <mc:AlternateContent xmlns:mc="http://schemas.openxmlformats.org/markup-compatibility/2006" xmlns:p159="http://schemas.microsoft.com/office/powerpoint/2015/09/main">
+    <mc:Choice Requires="p159">
+      <p:transition xmlns:p14="http://schemas.microsoft.com/office/powerpoint/2010/main" spd="slow" p14:dur="2000">
+        <p159:morph option="byObject"/>
+      </p:transition>
+    </mc:Choice>
+    <mc:Fallback xmlns="">
       <p:transition spd="slow">
         <p:fade/>
       </p:transition>
@@ -3926,6 +4606,50 @@
           </a:prstGeom>
         </p:spPr>
       </p:pic>
+      <p:sp>
+        <p:nvSpPr>
+          <p:cNvPr id="2" name="TextBox 1">
+            <a:extLst>
+              <a:ext uri="{FF2B5EF4-FFF2-40B4-BE49-F238E27FC236}">
+                <a16:creationId xmlns:a16="http://schemas.microsoft.com/office/drawing/2014/main" id="{44F3FF01-E416-871C-CD91-72B2C1E2E126}"/>
+              </a:ext>
+            </a:extLst>
+          </p:cNvPr>
+          <p:cNvSpPr txBox="1"/>
+          <p:nvPr/>
+        </p:nvSpPr>
+        <p:spPr>
+          <a:xfrm>
+            <a:off x="89647" y="277906"/>
+            <a:ext cx="1725426" cy="2031325"/>
+          </a:xfrm>
+          <a:prstGeom prst="rect">
+            <a:avLst/>
+          </a:prstGeom>
+          <a:noFill/>
+        </p:spPr>
+        <p:txBody>
+          <a:bodyPr wrap="square" rtlCol="0">
+            <a:spAutoFit/>
+          </a:bodyPr>
+          <a:lstStyle/>
+          <a:p>
+            <a:r>
+              <a:rPr lang="en-US" sz="1400" dirty="0"/>
+              <a:t>A simple to use and interactive dashboard that shows the significant data about the FAA dataset.</a:t>
+            </a:r>
+          </a:p>
+          <a:p>
+            <a:endParaRPr lang="en-US" sz="1400" dirty="0"/>
+          </a:p>
+          <a:p>
+            <a:r>
+              <a:rPr lang="en-US" sz="1400" dirty="0"/>
+              <a:t>The dashboard has four main parts.</a:t>
+            </a:r>
+          </a:p>
+        </p:txBody>
+      </p:sp>
     </p:spTree>
     <p:extLst>
       <p:ext uri="{BB962C8B-B14F-4D97-AF65-F5344CB8AC3E}">
@@ -3936,13 +4660,13 @@
   <p:clrMapOvr>
     <a:masterClrMapping/>
   </p:clrMapOvr>
-  <mc:AlternateContent xmlns:mc="http://schemas.openxmlformats.org/markup-compatibility/2006">
-    <mc:Choice xmlns:p159="http://schemas.microsoft.com/office/powerpoint/2015/09/main" Requires="p159">
+  <mc:AlternateContent xmlns:mc="http://schemas.openxmlformats.org/markup-compatibility/2006" xmlns:p159="http://schemas.microsoft.com/office/powerpoint/2015/09/main">
+    <mc:Choice Requires="p159">
       <p:transition xmlns:p14="http://schemas.microsoft.com/office/powerpoint/2010/main" spd="slow" p14:dur="2000">
         <p159:morph option="byObject"/>
       </p:transition>
     </mc:Choice>
-    <mc:Fallback>
+    <mc:Fallback xmlns="">
       <p:transition spd="slow">
         <p:fade/>
       </p:transition>
@@ -4080,6 +4804,50 @@
           </a:prstGeom>
         </p:spPr>
       </p:pic>
+      <p:sp>
+        <p:nvSpPr>
+          <p:cNvPr id="5" name="TextBox 4">
+            <a:extLst>
+              <a:ext uri="{FF2B5EF4-FFF2-40B4-BE49-F238E27FC236}">
+                <a16:creationId xmlns:a16="http://schemas.microsoft.com/office/drawing/2014/main" id="{BC539652-66D7-42DC-6E2A-FF9430F629C8}"/>
+              </a:ext>
+            </a:extLst>
+          </p:cNvPr>
+          <p:cNvSpPr txBox="1"/>
+          <p:nvPr/>
+        </p:nvSpPr>
+        <p:spPr>
+          <a:xfrm>
+            <a:off x="89647" y="277906"/>
+            <a:ext cx="1725426" cy="2246769"/>
+          </a:xfrm>
+          <a:prstGeom prst="rect">
+            <a:avLst/>
+          </a:prstGeom>
+          <a:noFill/>
+        </p:spPr>
+        <p:txBody>
+          <a:bodyPr wrap="square" rtlCol="0">
+            <a:spAutoFit/>
+          </a:bodyPr>
+          <a:lstStyle/>
+          <a:p>
+            <a:r>
+              <a:rPr lang="en-US" sz="1400" dirty="0"/>
+              <a:t>1. Cost Section</a:t>
+            </a:r>
+          </a:p>
+          <a:p>
+            <a:r>
+              <a:rPr lang="en-US" sz="1400" dirty="0"/>
+              <a:t>- this section updates the overall cost, airport cost and aircraft cost depending on which part of the dashboard is highlighted.</a:t>
+            </a:r>
+          </a:p>
+          <a:p>
+            <a:endParaRPr lang="en-US" sz="1400" dirty="0"/>
+          </a:p>
+        </p:txBody>
+      </p:sp>
     </p:spTree>
     <p:extLst>
       <p:ext uri="{BB962C8B-B14F-4D97-AF65-F5344CB8AC3E}">
@@ -4090,13 +4858,13 @@
   <p:clrMapOvr>
     <a:masterClrMapping/>
   </p:clrMapOvr>
-  <mc:AlternateContent xmlns:mc="http://schemas.openxmlformats.org/markup-compatibility/2006">
-    <mc:Choice xmlns:p159="http://schemas.microsoft.com/office/powerpoint/2015/09/main" Requires="p159">
+  <mc:AlternateContent xmlns:mc="http://schemas.openxmlformats.org/markup-compatibility/2006" xmlns:p159="http://schemas.microsoft.com/office/powerpoint/2015/09/main">
+    <mc:Choice Requires="p159">
       <p:transition xmlns:p14="http://schemas.microsoft.com/office/powerpoint/2010/main" spd="slow" p14:dur="2000">
         <p159:morph option="byObject"/>
       </p:transition>
     </mc:Choice>
-    <mc:Fallback>
+    <mc:Fallback xmlns="">
       <p:transition spd="slow">
         <p:fade/>
       </p:transition>
@@ -4162,13 +4930,13 @@
   <p:clrMapOvr>
     <a:masterClrMapping/>
   </p:clrMapOvr>
-  <mc:AlternateContent xmlns:mc="http://schemas.openxmlformats.org/markup-compatibility/2006">
-    <mc:Choice xmlns:p159="http://schemas.microsoft.com/office/powerpoint/2015/09/main" Requires="p159">
+  <mc:AlternateContent xmlns:mc="http://schemas.openxmlformats.org/markup-compatibility/2006" xmlns:p159="http://schemas.microsoft.com/office/powerpoint/2015/09/main">
+    <mc:Choice Requires="p159">
       <p:transition xmlns:p14="http://schemas.microsoft.com/office/powerpoint/2010/main" spd="slow" p14:dur="2000">
         <p159:morph option="byObject"/>
       </p:transition>
     </mc:Choice>
-    <mc:Fallback>
+    <mc:Fallback xmlns="">
       <p:transition spd="slow">
         <p:fade/>
       </p:transition>
@@ -4336,6 +5104,50 @@
           </a:prstGeom>
         </p:spPr>
       </p:pic>
+      <p:sp>
+        <p:nvSpPr>
+          <p:cNvPr id="6" name="TextBox 5">
+            <a:extLst>
+              <a:ext uri="{FF2B5EF4-FFF2-40B4-BE49-F238E27FC236}">
+                <a16:creationId xmlns:a16="http://schemas.microsoft.com/office/drawing/2014/main" id="{ABF9E967-1BDD-B95D-B2DA-07929668D370}"/>
+              </a:ext>
+            </a:extLst>
+          </p:cNvPr>
+          <p:cNvSpPr txBox="1"/>
+          <p:nvPr/>
+        </p:nvSpPr>
+        <p:spPr>
+          <a:xfrm>
+            <a:off x="89647" y="277906"/>
+            <a:ext cx="1725426" cy="2031325"/>
+          </a:xfrm>
+          <a:prstGeom prst="rect">
+            <a:avLst/>
+          </a:prstGeom>
+          <a:noFill/>
+        </p:spPr>
+        <p:txBody>
+          <a:bodyPr wrap="square" rtlCol="0">
+            <a:spAutoFit/>
+          </a:bodyPr>
+          <a:lstStyle/>
+          <a:p>
+            <a:r>
+              <a:rPr lang="en-US" sz="1400" dirty="0"/>
+              <a:t>2. Strikes Section</a:t>
+            </a:r>
+          </a:p>
+          <a:p>
+            <a:r>
+              <a:rPr lang="en-US" sz="1400" dirty="0"/>
+              <a:t>- this section updates the overall strikes and the cause of strike depending on which part of the dashboard is highlighted.</a:t>
+            </a:r>
+          </a:p>
+          <a:p>
+            <a:endParaRPr lang="en-US" sz="1400" dirty="0"/>
+          </a:p>
+        </p:txBody>
+      </p:sp>
     </p:spTree>
     <p:extLst>
       <p:ext uri="{BB962C8B-B14F-4D97-AF65-F5344CB8AC3E}">
@@ -4346,13 +5158,13 @@
   <p:clrMapOvr>
     <a:masterClrMapping/>
   </p:clrMapOvr>
-  <mc:AlternateContent xmlns:mc="http://schemas.openxmlformats.org/markup-compatibility/2006">
-    <mc:Choice xmlns:p159="http://schemas.microsoft.com/office/powerpoint/2015/09/main" Requires="p159">
+  <mc:AlternateContent xmlns:mc="http://schemas.openxmlformats.org/markup-compatibility/2006" xmlns:p159="http://schemas.microsoft.com/office/powerpoint/2015/09/main">
+    <mc:Choice Requires="p159">
       <p:transition xmlns:p14="http://schemas.microsoft.com/office/powerpoint/2010/main" spd="slow" p14:dur="2000">
         <p159:morph option="byObject"/>
       </p:transition>
     </mc:Choice>
-    <mc:Fallback>
+    <mc:Fallback xmlns="">
       <p:transition spd="slow">
         <p:fade/>
       </p:transition>
@@ -4418,13 +5230,13 @@
   <p:clrMapOvr>
     <a:masterClrMapping/>
   </p:clrMapOvr>
-  <mc:AlternateContent xmlns:mc="http://schemas.openxmlformats.org/markup-compatibility/2006">
-    <mc:Choice xmlns:p159="http://schemas.microsoft.com/office/powerpoint/2015/09/main" Requires="p159">
+  <mc:AlternateContent xmlns:mc="http://schemas.openxmlformats.org/markup-compatibility/2006" xmlns:p159="http://schemas.microsoft.com/office/powerpoint/2015/09/main">
+    <mc:Choice Requires="p159">
       <p:transition xmlns:p14="http://schemas.microsoft.com/office/powerpoint/2010/main" spd="slow" p14:dur="2000">
         <p159:morph option="byObject"/>
       </p:transition>
     </mc:Choice>
-    <mc:Fallback>
+    <mc:Fallback xmlns="">
       <p:transition spd="slow">
         <p:fade/>
       </p:transition>
@@ -4592,6 +5404,50 @@
           </a:prstGeom>
         </p:spPr>
       </p:pic>
+      <p:sp>
+        <p:nvSpPr>
+          <p:cNvPr id="6" name="TextBox 5">
+            <a:extLst>
+              <a:ext uri="{FF2B5EF4-FFF2-40B4-BE49-F238E27FC236}">
+                <a16:creationId xmlns:a16="http://schemas.microsoft.com/office/drawing/2014/main" id="{21FF61D9-8614-E61A-E091-D83102111D2D}"/>
+              </a:ext>
+            </a:extLst>
+          </p:cNvPr>
+          <p:cNvSpPr txBox="1"/>
+          <p:nvPr/>
+        </p:nvSpPr>
+        <p:spPr>
+          <a:xfrm>
+            <a:off x="89647" y="277906"/>
+            <a:ext cx="1725426" cy="1815882"/>
+          </a:xfrm>
+          <a:prstGeom prst="rect">
+            <a:avLst/>
+          </a:prstGeom>
+          <a:noFill/>
+        </p:spPr>
+        <p:txBody>
+          <a:bodyPr wrap="square" rtlCol="0">
+            <a:spAutoFit/>
+          </a:bodyPr>
+          <a:lstStyle/>
+          <a:p>
+            <a:r>
+              <a:rPr lang="en-US" sz="1400" dirty="0"/>
+              <a:t>3. Map Section</a:t>
+            </a:r>
+          </a:p>
+          <a:p>
+            <a:r>
+              <a:rPr lang="en-US" sz="1400" dirty="0"/>
+              <a:t>- this section displays the distribution of strikes, the cost and number of strikes based on the current selected filter.</a:t>
+            </a:r>
+          </a:p>
+          <a:p>
+            <a:endParaRPr lang="en-US" sz="1400" dirty="0"/>
+          </a:p>
+        </p:txBody>
+      </p:sp>
     </p:spTree>
     <p:extLst>
       <p:ext uri="{BB962C8B-B14F-4D97-AF65-F5344CB8AC3E}">
@@ -4602,13 +5458,13 @@
   <p:clrMapOvr>
     <a:masterClrMapping/>
   </p:clrMapOvr>
-  <mc:AlternateContent xmlns:mc="http://schemas.openxmlformats.org/markup-compatibility/2006">
-    <mc:Choice xmlns:p159="http://schemas.microsoft.com/office/powerpoint/2015/09/main" Requires="p159">
+  <mc:AlternateContent xmlns:mc="http://schemas.openxmlformats.org/markup-compatibility/2006" xmlns:p159="http://schemas.microsoft.com/office/powerpoint/2015/09/main">
+    <mc:Choice Requires="p159">
       <p:transition xmlns:p14="http://schemas.microsoft.com/office/powerpoint/2010/main" spd="slow" p14:dur="2000">
         <p159:morph option="byObject"/>
       </p:transition>
     </mc:Choice>
-    <mc:Fallback>
+    <mc:Fallback xmlns="">
       <p:transition spd="slow">
         <p:fade/>
       </p:transition>
@@ -4674,13 +5530,13 @@
   <p:clrMapOvr>
     <a:masterClrMapping/>
   </p:clrMapOvr>
-  <mc:AlternateContent xmlns:mc="http://schemas.openxmlformats.org/markup-compatibility/2006">
-    <mc:Choice xmlns:p159="http://schemas.microsoft.com/office/powerpoint/2015/09/main" Requires="p159">
+  <mc:AlternateContent xmlns:mc="http://schemas.openxmlformats.org/markup-compatibility/2006" xmlns:p159="http://schemas.microsoft.com/office/powerpoint/2015/09/main">
+    <mc:Choice Requires="p159">
       <p:transition xmlns:p14="http://schemas.microsoft.com/office/powerpoint/2010/main" spd="slow" p14:dur="2000">
         <p159:morph option="byObject"/>
       </p:transition>
     </mc:Choice>
-    <mc:Fallback>
+    <mc:Fallback xmlns="">
       <p:transition spd="slow">
         <p:fade/>
       </p:transition>
@@ -4848,6 +5704,50 @@
           </a:prstGeom>
         </p:spPr>
       </p:pic>
+      <p:sp>
+        <p:nvSpPr>
+          <p:cNvPr id="6" name="TextBox 5">
+            <a:extLst>
+              <a:ext uri="{FF2B5EF4-FFF2-40B4-BE49-F238E27FC236}">
+                <a16:creationId xmlns:a16="http://schemas.microsoft.com/office/drawing/2014/main" id="{EE41AAD7-6EA4-7F0A-C3DE-7AD23797F7D6}"/>
+              </a:ext>
+            </a:extLst>
+          </p:cNvPr>
+          <p:cNvSpPr txBox="1"/>
+          <p:nvPr/>
+        </p:nvSpPr>
+        <p:spPr>
+          <a:xfrm>
+            <a:off x="89647" y="277906"/>
+            <a:ext cx="1725426" cy="2246769"/>
+          </a:xfrm>
+          <a:prstGeom prst="rect">
+            <a:avLst/>
+          </a:prstGeom>
+          <a:noFill/>
+        </p:spPr>
+        <p:txBody>
+          <a:bodyPr wrap="square" rtlCol="0">
+            <a:spAutoFit/>
+          </a:bodyPr>
+          <a:lstStyle/>
+          <a:p>
+            <a:r>
+              <a:rPr lang="en-US" sz="1400" dirty="0"/>
+              <a:t>4. Heat Map Section</a:t>
+            </a:r>
+          </a:p>
+          <a:p>
+            <a:r>
+              <a:rPr lang="en-US" sz="1400" dirty="0"/>
+              <a:t>- this section displays the distribution of the strikes depending on the time of the day and year. It also responds to the current filter selected.</a:t>
+            </a:r>
+          </a:p>
+          <a:p>
+            <a:endParaRPr lang="en-US" sz="1400" dirty="0"/>
+          </a:p>
+        </p:txBody>
+      </p:sp>
     </p:spTree>
     <p:extLst>
       <p:ext uri="{BB962C8B-B14F-4D97-AF65-F5344CB8AC3E}">
@@ -4858,13 +5758,13 @@
   <p:clrMapOvr>
     <a:masterClrMapping/>
   </p:clrMapOvr>
-  <mc:AlternateContent xmlns:mc="http://schemas.openxmlformats.org/markup-compatibility/2006">
-    <mc:Choice xmlns:p159="http://schemas.microsoft.com/office/powerpoint/2015/09/main" Requires="p159">
+  <mc:AlternateContent xmlns:mc="http://schemas.openxmlformats.org/markup-compatibility/2006" xmlns:p159="http://schemas.microsoft.com/office/powerpoint/2015/09/main">
+    <mc:Choice Requires="p159">
       <p:transition xmlns:p14="http://schemas.microsoft.com/office/powerpoint/2010/main" spd="slow" p14:dur="2000">
         <p159:morph option="byObject"/>
       </p:transition>
     </mc:Choice>
-    <mc:Fallback>
+    <mc:Fallback xmlns="">
       <p:transition spd="slow">
         <p:fade/>
       </p:transition>

</xml_diff>